<commit_message>
adds some additional points to some ppts
</commit_message>
<xml_diff>
--- a/REPO_MarksCodeAndPPTs/DotNetPPTs/dotnetWeek3Ppts/D13.NET_MVCConcepts.pptx
+++ b/REPO_MarksCodeAndPPTs/DotNetPPTs/dotnetWeek3Ppts/D13.NET_MVCConcepts.pptx
@@ -14,6 +14,7 @@
     <p:sldId id="269" r:id="rId8"/>
     <p:sldId id="270" r:id="rId9"/>
     <p:sldId id="260" r:id="rId10"/>
+    <p:sldId id="271" r:id="rId11"/>
   </p:sldIdLst>
   <p:sldSz cx="12192000" cy="6858000"/>
   <p:notesSz cx="6858000" cy="9144000"/>
@@ -372,7 +373,7 @@
           <a:p>
             <a:fld id="{9184DA70-C731-4C70-880D-CCD4705E623C}" type="datetime1">
               <a:rPr lang="en-US" smtClean="0"/>
-              <a:t>3/23/2020</a:t>
+              <a:t>3/31/2020</a:t>
             </a:fld>
             <a:endParaRPr lang="en-US" dirty="0"/>
           </a:p>
@@ -560,7 +561,7 @@
           <a:p>
             <a:fld id="{B612A279-0833-481D-8C56-F67FD0AC6C50}" type="datetime1">
               <a:rPr lang="en-US" smtClean="0"/>
-              <a:t>3/23/2020</a:t>
+              <a:t>3/31/2020</a:t>
             </a:fld>
             <a:endParaRPr lang="en-US" dirty="0"/>
           </a:p>
@@ -802,7 +803,7 @@
           <a:p>
             <a:fld id="{6587DA83-5663-4C9C-B9AA-0B40A3DAFF81}" type="datetime1">
               <a:rPr lang="en-US" smtClean="0"/>
-              <a:t>3/23/2020</a:t>
+              <a:t>3/31/2020</a:t>
             </a:fld>
             <a:endParaRPr lang="en-US" dirty="0"/>
           </a:p>
@@ -990,7 +991,7 @@
           <a:p>
             <a:fld id="{4BE1D723-8F53-4F53-90B0-1982A396982E}" type="datetime1">
               <a:rPr lang="en-US" smtClean="0"/>
-              <a:t>3/23/2020</a:t>
+              <a:t>3/31/2020</a:t>
             </a:fld>
             <a:endParaRPr lang="en-US" dirty="0"/>
           </a:p>
@@ -1363,7 +1364,7 @@
           <a:p>
             <a:fld id="{97669AF7-7BEB-44E4-9852-375E34362B5B}" type="datetime1">
               <a:rPr lang="en-US" smtClean="0"/>
-              <a:t>3/23/2020</a:t>
+              <a:t>3/31/2020</a:t>
             </a:fld>
             <a:endParaRPr lang="en-US" dirty="0"/>
           </a:p>
@@ -1618,7 +1619,7 @@
           <a:p>
             <a:fld id="{BAAAC38D-0552-4C82-B593-E6124DFADBE2}" type="datetime1">
               <a:rPr lang="en-US" smtClean="0"/>
-              <a:t>3/23/2020</a:t>
+              <a:t>3/31/2020</a:t>
             </a:fld>
             <a:endParaRPr lang="en-US" dirty="0"/>
           </a:p>
@@ -2015,7 +2016,7 @@
           <a:p>
             <a:fld id="{D9DF0F1C-5577-4ACB-BB62-DF8F3C494C7E}" type="datetime1">
               <a:rPr lang="en-US" smtClean="0"/>
-              <a:t>3/23/2020</a:t>
+              <a:t>3/31/2020</a:t>
             </a:fld>
             <a:endParaRPr lang="en-US" dirty="0"/>
           </a:p>
@@ -2151,7 +2152,7 @@
           <a:p>
             <a:fld id="{1775B394-D9F9-4F0C-B15D-605F45CB9E9F}" type="datetime1">
               <a:rPr lang="en-US" smtClean="0"/>
-              <a:t>3/23/2020</a:t>
+              <a:t>3/31/2020</a:t>
             </a:fld>
             <a:endParaRPr lang="en-US" dirty="0"/>
           </a:p>
@@ -2308,7 +2309,7 @@
           <a:p>
             <a:fld id="{39667345-2558-425A-8533-9BFDBCE15005}" type="datetime1">
               <a:rPr lang="en-US" smtClean="0"/>
-              <a:t>3/23/2020</a:t>
+              <a:t>3/31/2020</a:t>
             </a:fld>
             <a:endParaRPr lang="en-US" dirty="0"/>
           </a:p>
@@ -2637,7 +2638,7 @@
           <a:p>
             <a:fld id="{92BEA474-078D-4E9B-9B14-09A87B19DC46}" type="datetime1">
               <a:rPr lang="en-US" smtClean="0"/>
-              <a:t>3/23/2020</a:t>
+              <a:t>3/31/2020</a:t>
             </a:fld>
             <a:endParaRPr lang="en-US" dirty="0"/>
           </a:p>
@@ -2987,7 +2988,7 @@
           <a:p>
             <a:fld id="{4907D986-8816-4272-A432-0437A28A9828}" type="datetime1">
               <a:rPr lang="en-US" smtClean="0"/>
-              <a:t>3/23/2020</a:t>
+              <a:t>3/31/2020</a:t>
             </a:fld>
             <a:endParaRPr lang="en-US" dirty="0"/>
           </a:p>
@@ -3248,7 +3249,7 @@
           <a:p>
             <a:fld id="{62D6E202-B606-4609-B914-27C9371A1F6D}" type="datetime1">
               <a:rPr lang="en-US" smtClean="0"/>
-              <a:t>3/23/2020</a:t>
+              <a:t>3/31/2020</a:t>
             </a:fld>
             <a:endParaRPr lang="en-US" dirty="0"/>
           </a:p>
@@ -4029,6 +4030,119 @@
 </p:sld>
 </file>
 
+<file path=ppt/slides/slide10.xml><?xml version="1.0" encoding="utf-8"?>
+<p:sld xmlns:a="http://schemas.openxmlformats.org/drawingml/2006/main" xmlns:r="http://schemas.openxmlformats.org/officeDocument/2006/relationships" xmlns:p="http://schemas.openxmlformats.org/presentationml/2006/main">
+  <p:cSld>
+    <p:spTree>
+      <p:nvGrpSpPr>
+        <p:cNvPr id="1" name=""/>
+        <p:cNvGrpSpPr/>
+        <p:nvPr/>
+      </p:nvGrpSpPr>
+      <p:grpSpPr>
+        <a:xfrm>
+          <a:off x="0" y="0"/>
+          <a:ext cx="0" cy="0"/>
+          <a:chOff x="0" y="0"/>
+          <a:chExt cx="0" cy="0"/>
+        </a:xfrm>
+      </p:grpSpPr>
+      <p:sp>
+        <p:nvSpPr>
+          <p:cNvPr id="2" name="Title 1">
+            <a:extLst>
+              <a:ext uri="{FF2B5EF4-FFF2-40B4-BE49-F238E27FC236}">
+                <a16:creationId xmlns:a16="http://schemas.microsoft.com/office/drawing/2014/main" id="{24A052E2-FB1A-48E9-8A4D-A8D15CB368F5}"/>
+              </a:ext>
+            </a:extLst>
+          </p:cNvPr>
+          <p:cNvSpPr>
+            <a:spLocks noGrp="1"/>
+          </p:cNvSpPr>
+          <p:nvPr>
+            <p:ph type="title"/>
+          </p:nvPr>
+        </p:nvSpPr>
+        <p:spPr/>
+        <p:txBody>
+          <a:bodyPr/>
+          <a:lstStyle/>
+          <a:p>
+            <a:r>
+              <a:rPr lang="en-US" dirty="0"/>
+              <a:t>Nicks p1 notes on whiteboard.</a:t>
+            </a:r>
+          </a:p>
+        </p:txBody>
+      </p:sp>
+      <p:sp>
+        <p:nvSpPr>
+          <p:cNvPr id="3" name="Content Placeholder 2">
+            <a:extLst>
+              <a:ext uri="{FF2B5EF4-FFF2-40B4-BE49-F238E27FC236}">
+                <a16:creationId xmlns:a16="http://schemas.microsoft.com/office/drawing/2014/main" id="{322DC5FB-994A-4EB5-9362-7DF0CF714469}"/>
+              </a:ext>
+            </a:extLst>
+          </p:cNvPr>
+          <p:cNvSpPr>
+            <a:spLocks noGrp="1"/>
+          </p:cNvSpPr>
+          <p:nvPr>
+            <p:ph idx="1"/>
+          </p:nvPr>
+        </p:nvSpPr>
+        <p:spPr/>
+        <p:txBody>
+          <a:bodyPr/>
+          <a:lstStyle/>
+          <a:p>
+            <a:endParaRPr lang="en-US"/>
+          </a:p>
+        </p:txBody>
+      </p:sp>
+      <p:pic>
+        <p:nvPicPr>
+          <p:cNvPr id="4" name="Picture 3">
+            <a:extLst>
+              <a:ext uri="{FF2B5EF4-FFF2-40B4-BE49-F238E27FC236}">
+                <a16:creationId xmlns:a16="http://schemas.microsoft.com/office/drawing/2014/main" id="{524FD194-300B-4DCA-8E7C-844EAC43EF11}"/>
+              </a:ext>
+            </a:extLst>
+          </p:cNvPr>
+          <p:cNvPicPr>
+            <a:picLocks noChangeAspect="1"/>
+          </p:cNvPicPr>
+          <p:nvPr/>
+        </p:nvPicPr>
+        <p:blipFill>
+          <a:blip r:embed="rId2"/>
+          <a:stretch>
+            <a:fillRect/>
+          </a:stretch>
+        </p:blipFill>
+        <p:spPr>
+          <a:xfrm>
+            <a:off x="2893298" y="2108201"/>
+            <a:ext cx="9148603" cy="4484759"/>
+          </a:xfrm>
+          <a:prstGeom prst="rect">
+            <a:avLst/>
+          </a:prstGeom>
+        </p:spPr>
+      </p:pic>
+    </p:spTree>
+    <p:extLst>
+      <p:ext uri="{BB962C8B-B14F-4D97-AF65-F5344CB8AC3E}">
+        <p14:creationId xmlns:p14="http://schemas.microsoft.com/office/powerpoint/2010/main" val="3509919496"/>
+      </p:ext>
+    </p:extLst>
+  </p:cSld>
+  <p:clrMapOvr>
+    <a:masterClrMapping/>
+  </p:clrMapOvr>
+</p:sld>
+</file>
+
 <file path=ppt/slides/slide2.xml><?xml version="1.0" encoding="utf-8"?>
 <p:sld xmlns:a="http://schemas.openxmlformats.org/drawingml/2006/main" xmlns:r="http://schemas.openxmlformats.org/officeDocument/2006/relationships" xmlns:p="http://schemas.openxmlformats.org/presentationml/2006/main">
   <p:cSld>

</xml_diff>